<commit_message>
New data, updated poster
</commit_message>
<xml_diff>
--- a/poster/H1B_Poster.pptx
+++ b/poster/H1B_Poster.pptx
@@ -5911,14 +5911,14 @@
           </a:ln>
           <a:extLst>
             <a:ext uri="{909E8E84-426E-40dd-AFC4-6F175D3DCCD1}">
-              <a14:hiddenFill xmlns:a14="http://schemas.microsoft.com/office/drawing/2010/main" xmlns="">
+              <a14:hiddenFill xmlns="" xmlns:a14="http://schemas.microsoft.com/office/drawing/2010/main">
                 <a:solidFill>
                   <a:srgbClr val="FFFFFF"/>
                 </a:solidFill>
               </a14:hiddenFill>
             </a:ext>
             <a:ext uri="{91240B29-F687-4f45-9708-019B960494DF}">
-              <a14:hiddenLine xmlns:a14="http://schemas.microsoft.com/office/drawing/2010/main" xmlns="" w="9525">
+              <a14:hiddenLine xmlns="" xmlns:a14="http://schemas.microsoft.com/office/drawing/2010/main" w="9525">
                 <a:solidFill>
                   <a:srgbClr val="000000"/>
                 </a:solidFill>
@@ -6930,7 +6930,7 @@
           <p:nvPr>
             <p:extLst>
               <p:ext uri="{D42A27DB-BD31-4B8C-83A1-F6EECF244321}">
-                <p14:modId xmlns:p14="http://schemas.microsoft.com/office/powerpoint/2010/main" val="1068699678"/>
+                <p14:modId xmlns:p14="http://schemas.microsoft.com/office/powerpoint/2010/main" val="3245728112"/>
               </p:ext>
             </p:extLst>
           </p:nvPr>
@@ -6953,14 +6953,14 @@
                     </a:ext>
                   </a:extLst>
                 </a:gridCol>
-                <a:gridCol w="4739149">
+                <a:gridCol w="5406688">
                   <a:extLst>
                     <a:ext uri="{9D8B030D-6E8A-4147-A177-3AD203B41FA5}">
                       <a16:colId xmlns:a16="http://schemas.microsoft.com/office/drawing/2014/main" val="328836238"/>
                     </a:ext>
                   </a:extLst>
                 </a:gridCol>
-                <a:gridCol w="4739149">
+                <a:gridCol w="4071610">
                   <a:extLst>
                     <a:ext uri="{9D8B030D-6E8A-4147-A177-3AD203B41FA5}">
                       <a16:colId xmlns:a16="http://schemas.microsoft.com/office/drawing/2014/main" val="2427766494"/>
@@ -7201,8 +7201,13 @@
                     <a:p>
                       <a:r>
                         <a:rPr lang="en-US" sz="4800" dirty="0"/>
-                        <a:t>MCR = 2.1%</a:t>
+                        <a:t>MCR </a:t>
                       </a:r>
+                      <a:r>
+                        <a:rPr lang="en-US" sz="4800"/>
+                        <a:t>= 2.2%</a:t>
+                      </a:r>
+                      <a:endParaRPr lang="en-US" sz="4800" dirty="0"/>
                     </a:p>
                   </a:txBody>
                   <a:tcPr>
@@ -9454,14 +9459,14 @@
           </a:ln>
           <a:extLst>
             <a:ext uri="{909E8E84-426E-40dd-AFC4-6F175D3DCCD1}">
-              <a14:hiddenFill xmlns="" xmlns:a14="http://schemas.microsoft.com/office/drawing/2010/main">
+              <a14:hiddenFill xmlns:a14="http://schemas.microsoft.com/office/drawing/2010/main" xmlns="">
                 <a:solidFill>
                   <a:srgbClr val="FFFFFF"/>
                 </a:solidFill>
               </a14:hiddenFill>
             </a:ext>
             <a:ext uri="{91240B29-F687-4f45-9708-019B960494DF}">
-              <a14:hiddenLine xmlns="" xmlns:a14="http://schemas.microsoft.com/office/drawing/2010/main" w="9525">
+              <a14:hiddenLine xmlns:a14="http://schemas.microsoft.com/office/drawing/2010/main" xmlns="" w="9525">
                 <a:solidFill>
                   <a:srgbClr val="000000"/>
                 </a:solidFill>

</xml_diff>

<commit_message>
add references on poster and add articles in the same folder
</commit_message>
<xml_diff>
--- a/poster/H1B_Poster.pptx
+++ b/poster/H1B_Poster.pptx
@@ -321,7 +321,7 @@
             <a:fld id="{1E44E51C-57D0-6B4C-9C03-A3E12CE0FF75}" type="datetime1">
               <a:rPr lang="en-US" altLang="en-US"/>
               <a:pPr/>
-              <a:t>12/7/2022</a:t>
+              <a:t>12/7/22</a:t>
             </a:fld>
             <a:endParaRPr lang="en-US" altLang="en-US"/>
           </a:p>
@@ -5648,14 +5648,14 @@
           </a:ln>
           <a:extLst>
             <a:ext uri="{909E8E84-426E-40dd-AFC4-6F175D3DCCD1}">
-              <a14:hiddenFill xmlns="" xmlns:a14="http://schemas.microsoft.com/office/drawing/2010/main">
+              <a14:hiddenFill xmlns:a14="http://schemas.microsoft.com/office/drawing/2010/main" xmlns="">
                 <a:solidFill>
                   <a:srgbClr val="FFFFFF"/>
                 </a:solidFill>
               </a14:hiddenFill>
             </a:ext>
             <a:ext uri="{91240B29-F687-4f45-9708-019B960494DF}">
-              <a14:hiddenLine xmlns="" xmlns:a14="http://schemas.microsoft.com/office/drawing/2010/main" w="9525">
+              <a14:hiddenLine xmlns:a14="http://schemas.microsoft.com/office/drawing/2010/main" xmlns="" w="9525">
                 <a:solidFill>
                   <a:srgbClr val="000000"/>
                 </a:solidFill>
@@ -6083,7 +6083,75 @@
                   <a:latin typeface="Calibri" panose="020F0502020204030204" pitchFamily="34" charset="0"/>
                   <a:cs typeface="Calibri" panose="020F0502020204030204" pitchFamily="34" charset="0"/>
                 </a:rPr>
-                <a:t>Primary References</a:t>
+                <a:t>Primary References - </a:t>
+              </a:r>
+              <a:r>
+                <a:rPr lang="en-US" altLang="en-US" sz="2800" dirty="0">
+                  <a:latin typeface="Calibri" panose="020F0502020204030204" pitchFamily="34" charset="0"/>
+                  <a:cs typeface="Calibri" panose="020F0502020204030204" pitchFamily="34" charset="0"/>
+                </a:rPr>
+                <a:t>US Department of Labor</a:t>
+              </a:r>
+              <a:endParaRPr lang="en-US" altLang="en-US" sz="2400" dirty="0">
+                <a:latin typeface="Calibri" panose="020F0502020204030204" pitchFamily="34" charset="0"/>
+                <a:cs typeface="Calibri" panose="020F0502020204030204" pitchFamily="34" charset="0"/>
+              </a:endParaRPr>
+            </a:p>
+            <a:p>
+              <a:pPr eaLnBrk="1" hangingPunct="1">
+                <a:spcBef>
+                  <a:spcPts val="771"/>
+                </a:spcBef>
+              </a:pPr>
+              <a:r>
+                <a:rPr lang="en-US" sz="1400" b="0" i="0" dirty="0">
+                  <a:solidFill>
+                    <a:srgbClr val="222222"/>
+                  </a:solidFill>
+                  <a:effectLst/>
+                  <a:latin typeface="Arial" panose="020B0604020202020204" pitchFamily="34" charset="0"/>
+                </a:rPr>
+                <a:t>Thakur, P., Singh, M., Singh, H., &amp; Rana, P. S. (2018). An allotment of H1B work VISA in USA using machine learning. </a:t>
+              </a:r>
+              <a:r>
+                <a:rPr lang="en-US" sz="1400" b="0" i="1" dirty="0">
+                  <a:solidFill>
+                    <a:srgbClr val="222222"/>
+                  </a:solidFill>
+                  <a:effectLst/>
+                  <a:latin typeface="Arial" panose="020B0604020202020204" pitchFamily="34" charset="0"/>
+                </a:rPr>
+                <a:t>International Journal of Engineering &amp; Technology</a:t>
+              </a:r>
+              <a:r>
+                <a:rPr lang="en-US" sz="1400" b="0" i="0" dirty="0">
+                  <a:solidFill>
+                    <a:srgbClr val="222222"/>
+                  </a:solidFill>
+                  <a:effectLst/>
+                  <a:latin typeface="Arial" panose="020B0604020202020204" pitchFamily="34" charset="0"/>
+                </a:rPr>
+                <a:t>, </a:t>
+              </a:r>
+              <a:r>
+                <a:rPr lang="en-US" sz="1400" b="0" i="1" dirty="0">
+                  <a:solidFill>
+                    <a:srgbClr val="222222"/>
+                  </a:solidFill>
+                  <a:effectLst/>
+                  <a:latin typeface="Arial" panose="020B0604020202020204" pitchFamily="34" charset="0"/>
+                </a:rPr>
+                <a:t>7</a:t>
+              </a:r>
+              <a:r>
+                <a:rPr lang="en-US" sz="1400" b="0" i="0" dirty="0">
+                  <a:solidFill>
+                    <a:srgbClr val="222222"/>
+                  </a:solidFill>
+                  <a:effectLst/>
+                  <a:latin typeface="Arial" panose="020B0604020202020204" pitchFamily="34" charset="0"/>
+                </a:rPr>
+                <a:t>(2.27), 93-103.</a:t>
               </a:r>
             </a:p>
             <a:p>
@@ -6093,12 +6161,99 @@
                 </a:spcBef>
               </a:pPr>
               <a:r>
-                <a:rPr lang="en-US" altLang="en-US" sz="2400" dirty="0">
-                  <a:latin typeface="Calibri" panose="020F0502020204030204" pitchFamily="34" charset="0"/>
-                  <a:cs typeface="Calibri" panose="020F0502020204030204" pitchFamily="34" charset="0"/>
+                <a:rPr lang="en-US" sz="1400" b="0" i="0" dirty="0">
+                  <a:solidFill>
+                    <a:srgbClr val="222222"/>
+                  </a:solidFill>
+                  <a:effectLst/>
+                  <a:latin typeface="Arial" panose="020B0604020202020204" pitchFamily="34" charset="0"/>
                 </a:rPr>
-                <a:t>US Department of Labor</a:t>
+                <a:t>Swain, D., Chakraborty, K., </a:t>
               </a:r>
+              <a:r>
+                <a:rPr lang="en-US" sz="1400" b="0" i="0" dirty="0" err="1">
+                  <a:solidFill>
+                    <a:srgbClr val="222222"/>
+                  </a:solidFill>
+                  <a:effectLst/>
+                  <a:latin typeface="Arial" panose="020B0604020202020204" pitchFamily="34" charset="0"/>
+                </a:rPr>
+                <a:t>Dombe</a:t>
+              </a:r>
+              <a:r>
+                <a:rPr lang="en-US" sz="1400" b="0" i="0" dirty="0">
+                  <a:solidFill>
+                    <a:srgbClr val="222222"/>
+                  </a:solidFill>
+                  <a:effectLst/>
+                  <a:latin typeface="Arial" panose="020B0604020202020204" pitchFamily="34" charset="0"/>
+                </a:rPr>
+                <a:t>, A., </a:t>
+              </a:r>
+              <a:r>
+                <a:rPr lang="en-US" sz="1400" b="0" i="0" dirty="0" err="1">
+                  <a:solidFill>
+                    <a:srgbClr val="222222"/>
+                  </a:solidFill>
+                  <a:effectLst/>
+                  <a:latin typeface="Arial" panose="020B0604020202020204" pitchFamily="34" charset="0"/>
+                </a:rPr>
+                <a:t>Ashture</a:t>
+              </a:r>
+              <a:r>
+                <a:rPr lang="en-US" sz="1400" b="0" i="0" dirty="0">
+                  <a:solidFill>
+                    <a:srgbClr val="222222"/>
+                  </a:solidFill>
+                  <a:effectLst/>
+                  <a:latin typeface="Arial" panose="020B0604020202020204" pitchFamily="34" charset="0"/>
+                </a:rPr>
+                <a:t>, A., &amp; </a:t>
+              </a:r>
+              <a:r>
+                <a:rPr lang="en-US" sz="1400" b="0" i="0" dirty="0" err="1">
+                  <a:solidFill>
+                    <a:srgbClr val="222222"/>
+                  </a:solidFill>
+                  <a:effectLst/>
+                  <a:latin typeface="Arial" panose="020B0604020202020204" pitchFamily="34" charset="0"/>
+                </a:rPr>
+                <a:t>Valakunde</a:t>
+              </a:r>
+              <a:r>
+                <a:rPr lang="en-US" sz="1400" b="0" i="0" dirty="0">
+                  <a:solidFill>
+                    <a:srgbClr val="222222"/>
+                  </a:solidFill>
+                  <a:effectLst/>
+                  <a:latin typeface="Arial" panose="020B0604020202020204" pitchFamily="34" charset="0"/>
+                </a:rPr>
+                <a:t>, N. (2018, December). Prediction of H1B Visa Using Machine Learning Algorithms. In </a:t>
+              </a:r>
+              <a:r>
+                <a:rPr lang="en-US" sz="1400" b="0" i="1" dirty="0">
+                  <a:solidFill>
+                    <a:srgbClr val="222222"/>
+                  </a:solidFill>
+                  <a:effectLst/>
+                  <a:latin typeface="Arial" panose="020B0604020202020204" pitchFamily="34" charset="0"/>
+                </a:rPr>
+                <a:t>2018 International Conference on Advanced Computation and Telecommunication (ICACAT)</a:t>
+              </a:r>
+              <a:r>
+                <a:rPr lang="en-US" sz="1400" b="0" i="0" dirty="0">
+                  <a:solidFill>
+                    <a:srgbClr val="222222"/>
+                  </a:solidFill>
+                  <a:effectLst/>
+                  <a:latin typeface="Arial" panose="020B0604020202020204" pitchFamily="34" charset="0"/>
+                </a:rPr>
+                <a:t> (pp. 1-7). IEEE.</a:t>
+              </a:r>
+              <a:endParaRPr lang="en-US" altLang="en-US" sz="2400" dirty="0">
+                <a:latin typeface="Calibri" panose="020F0502020204030204" pitchFamily="34" charset="0"/>
+                <a:cs typeface="Calibri" panose="020F0502020204030204" pitchFamily="34" charset="0"/>
+              </a:endParaRPr>
             </a:p>
             <a:p>
               <a:pPr eaLnBrk="1" hangingPunct="1">
@@ -6664,13 +6819,13 @@
           <p:nvPr>
             <p:extLst>
               <p:ext uri="{D42A27DB-BD31-4B8C-83A1-F6EECF244321}">
-                <p14:modId xmlns:p14="http://schemas.microsoft.com/office/powerpoint/2010/main" val="2739245028"/>
+                <p14:modId xmlns:p14="http://schemas.microsoft.com/office/powerpoint/2010/main" val="294365757"/>
               </p:ext>
             </p:extLst>
           </p:nvPr>
         </p:nvGraphicFramePr>
         <p:xfrm>
-          <a:off x="9437563" y="5258172"/>
+          <a:off x="9281590" y="5599415"/>
           <a:ext cx="14217447" cy="11134308"/>
         </p:xfrm>
         <a:graphic>

</xml_diff>

<commit_message>
Tidy and PPT edit
</commit_message>
<xml_diff>
--- a/poster/H1B_Poster.pptx
+++ b/poster/H1B_Poster.pptx
@@ -206,6 +206,35 @@
 </p:presentation>
 </file>
 
+<file path=ppt/changesInfos/changesInfo1.xml><?xml version="1.0" encoding="utf-8"?>
+<pc:chgInfo xmlns:a="http://schemas.openxmlformats.org/drawingml/2006/main" xmlns:r="http://schemas.openxmlformats.org/officeDocument/2006/relationships" xmlns:ac="http://schemas.microsoft.com/office/drawing/2013/main/command" xmlns:pc="http://schemas.microsoft.com/office/powerpoint/2013/main/command">
+  <pc:docChgLst>
+    <pc:chgData name="Jeremy Joy" userId="662af16f3b4df569" providerId="LiveId" clId="{3323F38E-2960-4CEA-8C33-4850C8DB3BC7}"/>
+    <pc:docChg chg="modSld">
+      <pc:chgData name="Jeremy Joy" userId="662af16f3b4df569" providerId="LiveId" clId="{3323F38E-2960-4CEA-8C33-4850C8DB3BC7}" dt="2022-12-08T16:54:03.295" v="9" actId="6549"/>
+      <pc:docMkLst>
+        <pc:docMk/>
+      </pc:docMkLst>
+      <pc:sldChg chg="modSp mod">
+        <pc:chgData name="Jeremy Joy" userId="662af16f3b4df569" providerId="LiveId" clId="{3323F38E-2960-4CEA-8C33-4850C8DB3BC7}" dt="2022-12-08T16:54:03.295" v="9" actId="6549"/>
+        <pc:sldMkLst>
+          <pc:docMk/>
+          <pc:sldMk cId="0" sldId="256"/>
+        </pc:sldMkLst>
+        <pc:graphicFrameChg chg="modGraphic">
+          <ac:chgData name="Jeremy Joy" userId="662af16f3b4df569" providerId="LiveId" clId="{3323F38E-2960-4CEA-8C33-4850C8DB3BC7}" dt="2022-12-08T16:54:03.295" v="9" actId="6549"/>
+          <ac:graphicFrameMkLst>
+            <pc:docMk/>
+            <pc:sldMk cId="0" sldId="256"/>
+            <ac:graphicFrameMk id="2" creationId="{7607344A-B8AE-3810-2409-CA405621E773}"/>
+          </ac:graphicFrameMkLst>
+        </pc:graphicFrameChg>
+      </pc:sldChg>
+    </pc:docChg>
+  </pc:docChgLst>
+</pc:chgInfo>
+</file>
+
 <file path=ppt/notesMasters/notesMaster1.xml><?xml version="1.0" encoding="utf-8"?>
 <p:notesMaster xmlns:a="http://schemas.openxmlformats.org/drawingml/2006/main" xmlns:r="http://schemas.openxmlformats.org/officeDocument/2006/relationships" xmlns:p="http://schemas.openxmlformats.org/presentationml/2006/main">
   <p:cSld>
@@ -321,7 +350,7 @@
             <a:fld id="{1E44E51C-57D0-6B4C-9C03-A3E12CE0FF75}" type="datetime1">
               <a:rPr lang="en-US" altLang="en-US"/>
               <a:pPr/>
-              <a:t>12/7/22</a:t>
+              <a:t>12/8/2022</a:t>
             </a:fld>
             <a:endParaRPr lang="en-US" altLang="en-US"/>
           </a:p>
@@ -5648,14 +5677,14 @@
           </a:ln>
           <a:extLst>
             <a:ext uri="{909E8E84-426E-40dd-AFC4-6F175D3DCCD1}">
-              <a14:hiddenFill xmlns:a14="http://schemas.microsoft.com/office/drawing/2010/main" xmlns="">
+              <a14:hiddenFill xmlns="" xmlns:a14="http://schemas.microsoft.com/office/drawing/2010/main">
                 <a:solidFill>
                   <a:srgbClr val="FFFFFF"/>
                 </a:solidFill>
               </a14:hiddenFill>
             </a:ext>
             <a:ext uri="{91240B29-F687-4f45-9708-019B960494DF}">
-              <a14:hiddenLine xmlns:a14="http://schemas.microsoft.com/office/drawing/2010/main" xmlns="" w="9525">
+              <a14:hiddenLine xmlns="" xmlns:a14="http://schemas.microsoft.com/office/drawing/2010/main" w="9525">
                 <a:solidFill>
                   <a:srgbClr val="000000"/>
                 </a:solidFill>
@@ -6819,7 +6848,7 @@
           <p:nvPr>
             <p:extLst>
               <p:ext uri="{D42A27DB-BD31-4B8C-83A1-F6EECF244321}">
-                <p14:modId xmlns:p14="http://schemas.microsoft.com/office/powerpoint/2010/main" val="294365757"/>
+                <p14:modId xmlns:p14="http://schemas.microsoft.com/office/powerpoint/2010/main" val="207367912"/>
               </p:ext>
             </p:extLst>
           </p:nvPr>
@@ -7247,8 +7276,12 @@
                     <a:lstStyle/>
                     <a:p>
                       <a:r>
+                        <a:rPr lang="en-US" sz="4800" dirty="0"/>
+                        <a:t>RMSE </a:t>
+                      </a:r>
+                      <a:r>
                         <a:rPr lang="en-US" sz="4800"/>
-                        <a:t>MCR = 2.3%</a:t>
+                        <a:t>= 0.11</a:t>
                       </a:r>
                       <a:endParaRPr lang="en-US" sz="4800" dirty="0"/>
                     </a:p>
@@ -7299,7 +7332,7 @@
                     <a:p>
                       <a:r>
                         <a:rPr lang="en-US" sz="4800" dirty="0"/>
-                        <a:t>8</a:t>
+                        <a:t>18</a:t>
                       </a:r>
                     </a:p>
                   </a:txBody>

</xml_diff>